<commit_message>
initial rmd file 1
</commit_message>
<xml_diff>
--- a/TermProjectProposal.pptx
+++ b/TermProjectProposal.pptx
@@ -2464,7 +2464,7 @@
           <a:p>
             <a:fld id="{3C04E684-10F4-4CC3-A0B9-F03AA7BE37CF}" type="datetimeFigureOut">
               <a:rPr lang="en-US" smtClean="0"/>
-              <a:t>1/12/21</a:t>
+              <a:t>1/19/21</a:t>
             </a:fld>
             <a:endParaRPr lang="en-US"/>
           </a:p>
@@ -4954,7 +4954,7 @@
           <a:p>
             <a:fld id="{3C04E684-10F4-4CC3-A0B9-F03AA7BE37CF}" type="datetimeFigureOut">
               <a:rPr lang="en-US" smtClean="0"/>
-              <a:t>1/12/21</a:t>
+              <a:t>1/19/21</a:t>
             </a:fld>
             <a:endParaRPr lang="en-US"/>
           </a:p>
@@ -5152,7 +5152,7 @@
           <a:p>
             <a:fld id="{3C04E684-10F4-4CC3-A0B9-F03AA7BE37CF}" type="datetimeFigureOut">
               <a:rPr lang="en-US" smtClean="0"/>
-              <a:t>1/12/21</a:t>
+              <a:t>1/19/21</a:t>
             </a:fld>
             <a:endParaRPr lang="en-US"/>
           </a:p>
@@ -5360,7 +5360,7 @@
           <a:p>
             <a:fld id="{3C04E684-10F4-4CC3-A0B9-F03AA7BE37CF}" type="datetimeFigureOut">
               <a:rPr lang="en-US" smtClean="0"/>
-              <a:t>1/12/21</a:t>
+              <a:t>1/19/21</a:t>
             </a:fld>
             <a:endParaRPr lang="en-US"/>
           </a:p>
@@ -6097,7 +6097,7 @@
           <a:p>
             <a:fld id="{3C04E684-10F4-4CC3-A0B9-F03AA7BE37CF}" type="datetimeFigureOut">
               <a:rPr lang="en-US" smtClean="0"/>
-              <a:t>1/12/21</a:t>
+              <a:t>1/19/21</a:t>
             </a:fld>
             <a:endParaRPr lang="en-US"/>
           </a:p>
@@ -6739,7 +6739,7 @@
           <a:p>
             <a:fld id="{3C04E684-10F4-4CC3-A0B9-F03AA7BE37CF}" type="datetimeFigureOut">
               <a:rPr lang="en-US" smtClean="0"/>
-              <a:t>1/12/21</a:t>
+              <a:t>1/19/21</a:t>
             </a:fld>
             <a:endParaRPr lang="en-US"/>
           </a:p>
@@ -7539,7 +7539,7 @@
           <a:p>
             <a:fld id="{3C04E684-10F4-4CC3-A0B9-F03AA7BE37CF}" type="datetimeFigureOut">
               <a:rPr lang="en-US" smtClean="0"/>
-              <a:t>1/12/21</a:t>
+              <a:t>1/19/21</a:t>
             </a:fld>
             <a:endParaRPr lang="en-US"/>
           </a:p>
@@ -8490,7 +8490,7 @@
           <a:p>
             <a:fld id="{3C04E684-10F4-4CC3-A0B9-F03AA7BE37CF}" type="datetimeFigureOut">
               <a:rPr lang="en-US" smtClean="0"/>
-              <a:t>1/12/21</a:t>
+              <a:t>1/19/21</a:t>
             </a:fld>
             <a:endParaRPr lang="en-US"/>
           </a:p>
@@ -10839,7 +10839,7 @@
           <a:p>
             <a:fld id="{3C04E684-10F4-4CC3-A0B9-F03AA7BE37CF}" type="datetimeFigureOut">
               <a:rPr lang="en-US" smtClean="0"/>
-              <a:t>1/12/21</a:t>
+              <a:t>1/19/21</a:t>
             </a:fld>
             <a:endParaRPr lang="en-US"/>
           </a:p>
@@ -10952,7 +10952,7 @@
           <a:p>
             <a:fld id="{3C04E684-10F4-4CC3-A0B9-F03AA7BE37CF}" type="datetimeFigureOut">
               <a:rPr lang="en-US" smtClean="0"/>
-              <a:t>1/12/21</a:t>
+              <a:t>1/19/21</a:t>
             </a:fld>
             <a:endParaRPr lang="en-US"/>
           </a:p>
@@ -11459,7 +11459,7 @@
           <a:p>
             <a:fld id="{3C04E684-10F4-4CC3-A0B9-F03AA7BE37CF}" type="datetimeFigureOut">
               <a:rPr lang="en-US" smtClean="0"/>
-              <a:t>1/12/21</a:t>
+              <a:t>1/19/21</a:t>
             </a:fld>
             <a:endParaRPr lang="en-US"/>
           </a:p>
@@ -12762,7 +12762,7 @@
           <a:p>
             <a:fld id="{3C04E684-10F4-4CC3-A0B9-F03AA7BE37CF}" type="datetimeFigureOut">
               <a:rPr lang="en-US" smtClean="0"/>
-              <a:t>1/12/21</a:t>
+              <a:t>1/19/21</a:t>
             </a:fld>
             <a:endParaRPr lang="en-US"/>
           </a:p>
@@ -13009,7 +13009,7 @@
           <a:p>
             <a:fld id="{3C04E684-10F4-4CC3-A0B9-F03AA7BE37CF}" type="datetimeFigureOut">
               <a:rPr lang="en-US" smtClean="0"/>
-              <a:t>1/12/21</a:t>
+              <a:t>1/19/21</a:t>
             </a:fld>
             <a:endParaRPr lang="en-US"/>
           </a:p>

</xml_diff>